<commit_message>
Corrections sur la carte Rev A MSP430
- Pas de pullup interne ds MSP430
- Correction sérigraphie et empreinte connecteur de PROG
- Décalage LED
- Suppression de l'entrée débit
- Empreinte des doides TVS et des capas pour être soudables à la main
- Empreinte D12 horizontale
- C8 et C10 en 805 au lieu de 603
- Grossissement de la sérigraphie de version
</commit_message>
<xml_diff>
--- a/oyas/slaves_rs485/hard/msp430/infos.pptx
+++ b/oyas/slaves_rs485/hard/msp430/infos.pptx
@@ -104,6 +104,11 @@
       </a:defRPr>
     </a:lvl9pPr>
   </p:defaultTextStyle>
+  <p:extLst>
+    <p:ext uri="{EFAFB233-063F-42B5-8137-9DF3F51BA10A}">
+      <p15:sldGuideLst xmlns:p15="http://schemas.microsoft.com/office/powerpoint/2012/main"/>
+    </p:ext>
+  </p:extLst>
 </p:presentation>
 </file>
 
@@ -254,7 +259,7 @@
           <a:p>
             <a:fld id="{A12884BD-B6B9-4ABA-A4A0-2BD2B843FE89}" type="datetimeFigureOut">
               <a:rPr lang="fr-FR" smtClean="0"/>
-              <a:t>28/02/2025</a:t>
+              <a:t>08/04/2025</a:t>
             </a:fld>
             <a:endParaRPr lang="fr-FR"/>
           </a:p>
@@ -452,7 +457,7 @@
           <a:p>
             <a:fld id="{A12884BD-B6B9-4ABA-A4A0-2BD2B843FE89}" type="datetimeFigureOut">
               <a:rPr lang="fr-FR" smtClean="0"/>
-              <a:t>28/02/2025</a:t>
+              <a:t>08/04/2025</a:t>
             </a:fld>
             <a:endParaRPr lang="fr-FR"/>
           </a:p>
@@ -660,7 +665,7 @@
           <a:p>
             <a:fld id="{A12884BD-B6B9-4ABA-A4A0-2BD2B843FE89}" type="datetimeFigureOut">
               <a:rPr lang="fr-FR" smtClean="0"/>
-              <a:t>28/02/2025</a:t>
+              <a:t>08/04/2025</a:t>
             </a:fld>
             <a:endParaRPr lang="fr-FR"/>
           </a:p>
@@ -858,7 +863,7 @@
           <a:p>
             <a:fld id="{A12884BD-B6B9-4ABA-A4A0-2BD2B843FE89}" type="datetimeFigureOut">
               <a:rPr lang="fr-FR" smtClean="0"/>
-              <a:t>28/02/2025</a:t>
+              <a:t>08/04/2025</a:t>
             </a:fld>
             <a:endParaRPr lang="fr-FR"/>
           </a:p>
@@ -1133,7 +1138,7 @@
           <a:p>
             <a:fld id="{A12884BD-B6B9-4ABA-A4A0-2BD2B843FE89}" type="datetimeFigureOut">
               <a:rPr lang="fr-FR" smtClean="0"/>
-              <a:t>28/02/2025</a:t>
+              <a:t>08/04/2025</a:t>
             </a:fld>
             <a:endParaRPr lang="fr-FR"/>
           </a:p>
@@ -1398,7 +1403,7 @@
           <a:p>
             <a:fld id="{A12884BD-B6B9-4ABA-A4A0-2BD2B843FE89}" type="datetimeFigureOut">
               <a:rPr lang="fr-FR" smtClean="0"/>
-              <a:t>28/02/2025</a:t>
+              <a:t>08/04/2025</a:t>
             </a:fld>
             <a:endParaRPr lang="fr-FR"/>
           </a:p>
@@ -1810,7 +1815,7 @@
           <a:p>
             <a:fld id="{A12884BD-B6B9-4ABA-A4A0-2BD2B843FE89}" type="datetimeFigureOut">
               <a:rPr lang="fr-FR" smtClean="0"/>
-              <a:t>28/02/2025</a:t>
+              <a:t>08/04/2025</a:t>
             </a:fld>
             <a:endParaRPr lang="fr-FR"/>
           </a:p>
@@ -1951,7 +1956,7 @@
           <a:p>
             <a:fld id="{A12884BD-B6B9-4ABA-A4A0-2BD2B843FE89}" type="datetimeFigureOut">
               <a:rPr lang="fr-FR" smtClean="0"/>
-              <a:t>28/02/2025</a:t>
+              <a:t>08/04/2025</a:t>
             </a:fld>
             <a:endParaRPr lang="fr-FR"/>
           </a:p>
@@ -2064,7 +2069,7 @@
           <a:p>
             <a:fld id="{A12884BD-B6B9-4ABA-A4A0-2BD2B843FE89}" type="datetimeFigureOut">
               <a:rPr lang="fr-FR" smtClean="0"/>
-              <a:t>28/02/2025</a:t>
+              <a:t>08/04/2025</a:t>
             </a:fld>
             <a:endParaRPr lang="fr-FR"/>
           </a:p>
@@ -2375,7 +2380,7 @@
           <a:p>
             <a:fld id="{A12884BD-B6B9-4ABA-A4A0-2BD2B843FE89}" type="datetimeFigureOut">
               <a:rPr lang="fr-FR" smtClean="0"/>
-              <a:t>28/02/2025</a:t>
+              <a:t>08/04/2025</a:t>
             </a:fld>
             <a:endParaRPr lang="fr-FR"/>
           </a:p>
@@ -2663,7 +2668,7 @@
           <a:p>
             <a:fld id="{A12884BD-B6B9-4ABA-A4A0-2BD2B843FE89}" type="datetimeFigureOut">
               <a:rPr lang="fr-FR" smtClean="0"/>
-              <a:t>28/02/2025</a:t>
+              <a:t>08/04/2025</a:t>
             </a:fld>
             <a:endParaRPr lang="fr-FR"/>
           </a:p>
@@ -2904,7 +2909,7 @@
           <a:p>
             <a:fld id="{A12884BD-B6B9-4ABA-A4A0-2BD2B843FE89}" type="datetimeFigureOut">
               <a:rPr lang="fr-FR" smtClean="0"/>
-              <a:t>28/02/2025</a:t>
+              <a:t>08/04/2025</a:t>
             </a:fld>
             <a:endParaRPr lang="fr-FR"/>
           </a:p>
@@ -3345,6 +3350,126 @@
           <a:xfrm>
             <a:off x="475496" y="375384"/>
             <a:ext cx="2046002" cy="2099668"/>
+          </a:xfrm>
+          <a:prstGeom prst="rect">
+            <a:avLst/>
+          </a:prstGeom>
+        </p:spPr>
+      </p:pic>
+      <p:pic>
+        <p:nvPicPr>
+          <p:cNvPr id="3" name="Image 2">
+            <a:extLst>
+              <a:ext uri="{FF2B5EF4-FFF2-40B4-BE49-F238E27FC236}">
+                <a16:creationId xmlns:a16="http://schemas.microsoft.com/office/drawing/2014/main" id="{DAE8CA96-34C5-8E4C-DD28-90BF46F9174A}"/>
+              </a:ext>
+            </a:extLst>
+          </p:cNvPr>
+          <p:cNvPicPr>
+            <a:picLocks noChangeAspect="1"/>
+          </p:cNvPicPr>
+          <p:nvPr/>
+        </p:nvPicPr>
+        <p:blipFill>
+          <a:blip r:embed="rId3"/>
+          <a:stretch>
+            <a:fillRect/>
+          </a:stretch>
+        </p:blipFill>
+        <p:spPr>
+          <a:xfrm>
+            <a:off x="6200790" y="116510"/>
+            <a:ext cx="5849166" cy="2381582"/>
+          </a:xfrm>
+          <a:prstGeom prst="rect">
+            <a:avLst/>
+          </a:prstGeom>
+        </p:spPr>
+      </p:pic>
+      <p:pic>
+        <p:nvPicPr>
+          <p:cNvPr id="6" name="Image 5">
+            <a:extLst>
+              <a:ext uri="{FF2B5EF4-FFF2-40B4-BE49-F238E27FC236}">
+                <a16:creationId xmlns:a16="http://schemas.microsoft.com/office/drawing/2014/main" id="{EE6C303A-1585-8AAF-E912-531DEF0F1D24}"/>
+              </a:ext>
+            </a:extLst>
+          </p:cNvPr>
+          <p:cNvPicPr>
+            <a:picLocks noChangeAspect="1"/>
+          </p:cNvPicPr>
+          <p:nvPr/>
+        </p:nvPicPr>
+        <p:blipFill>
+          <a:blip r:embed="rId4"/>
+          <a:stretch>
+            <a:fillRect/>
+          </a:stretch>
+        </p:blipFill>
+        <p:spPr>
+          <a:xfrm>
+            <a:off x="6096000" y="2589869"/>
+            <a:ext cx="5953956" cy="2410161"/>
+          </a:xfrm>
+          <a:prstGeom prst="rect">
+            <a:avLst/>
+          </a:prstGeom>
+        </p:spPr>
+      </p:pic>
+      <p:pic>
+        <p:nvPicPr>
+          <p:cNvPr id="8" name="Image 7">
+            <a:extLst>
+              <a:ext uri="{FF2B5EF4-FFF2-40B4-BE49-F238E27FC236}">
+                <a16:creationId xmlns:a16="http://schemas.microsoft.com/office/drawing/2014/main" id="{F259988C-500A-D4D1-F251-65E386A97D06}"/>
+              </a:ext>
+            </a:extLst>
+          </p:cNvPr>
+          <p:cNvPicPr>
+            <a:picLocks noChangeAspect="1"/>
+          </p:cNvPicPr>
+          <p:nvPr/>
+        </p:nvPicPr>
+        <p:blipFill>
+          <a:blip r:embed="rId5"/>
+          <a:stretch>
+            <a:fillRect/>
+          </a:stretch>
+        </p:blipFill>
+        <p:spPr>
+          <a:xfrm>
+            <a:off x="7332213" y="4879857"/>
+            <a:ext cx="4546956" cy="1880267"/>
+          </a:xfrm>
+          <a:prstGeom prst="rect">
+            <a:avLst/>
+          </a:prstGeom>
+        </p:spPr>
+      </p:pic>
+      <p:pic>
+        <p:nvPicPr>
+          <p:cNvPr id="10" name="Image 9">
+            <a:extLst>
+              <a:ext uri="{FF2B5EF4-FFF2-40B4-BE49-F238E27FC236}">
+                <a16:creationId xmlns:a16="http://schemas.microsoft.com/office/drawing/2014/main" id="{F8BA36A9-0685-E32D-15D0-060190FBF050}"/>
+              </a:ext>
+            </a:extLst>
+          </p:cNvPr>
+          <p:cNvPicPr>
+            <a:picLocks noChangeAspect="1"/>
+          </p:cNvPicPr>
+          <p:nvPr/>
+        </p:nvPicPr>
+        <p:blipFill>
+          <a:blip r:embed="rId6"/>
+          <a:stretch>
+            <a:fillRect/>
+          </a:stretch>
+        </p:blipFill>
+        <p:spPr>
+          <a:xfrm>
+            <a:off x="611394" y="3429000"/>
+            <a:ext cx="4322032" cy="2704756"/>
           </a:xfrm>
           <a:prstGeom prst="rect">
             <a:avLst/>

</xml_diff>